<commit_message>
Logic Diagrams: Update Logic component Class + Sequence diagrams
</commit_message>
<xml_diff>
--- a/docs/diagrams/LogicComponentClassDiagram.pptx
+++ b/docs/diagrams/LogicComponentClassDiagram.pptx
@@ -127,7 +127,40 @@
 </file>
 
 <file path=ppt/revisionInfo.xml><?xml version="1.0" encoding="utf-8"?>
-<p1510:revInfo xmlns:a="http://schemas.openxmlformats.org/drawingml/2006/main" xmlns:r="http://schemas.openxmlformats.org/officeDocument/2006/relationships" xmlns:p1510="http://schemas.microsoft.com/office/powerpoint/2015/10/main"/>
+<p1510:revInfo xmlns:a="http://schemas.openxmlformats.org/drawingml/2006/main" xmlns:r="http://schemas.openxmlformats.org/officeDocument/2006/relationships" xmlns:p1510="http://schemas.microsoft.com/office/powerpoint/2015/10/main">
+  <p1510:revLst>
+    <p1510:client id="{7BE287D8-C8B6-4690-B1A6-8638E82ECD98}" v="16" dt="2018-09-21T08:58:29.170"/>
+  </p1510:revLst>
+</p1510:revInfo>
+</file>
+
+<file path=ppt/changesInfos/changesInfo1.xml><?xml version="1.0" encoding="utf-8"?>
+<pc:chgInfo xmlns:a="http://schemas.openxmlformats.org/drawingml/2006/main" xmlns:r="http://schemas.openxmlformats.org/officeDocument/2006/relationships" xmlns:ac="http://schemas.microsoft.com/office/drawing/2013/main/command" xmlns:pc="http://schemas.microsoft.com/office/powerpoint/2013/main/command">
+  <pc:docChgLst>
+    <pc:chgData name="Lionel Tan Junzer" userId="04b849c6f1991e6b" providerId="LiveId" clId="{7BE287D8-C8B6-4690-B1A6-8638E82ECD98}"/>
+    <pc:docChg chg="modSld">
+      <pc:chgData name="Lionel Tan Junzer" userId="04b849c6f1991e6b" providerId="LiveId" clId="{7BE287D8-C8B6-4690-B1A6-8638E82ECD98}" dt="2018-09-21T08:58:29.170" v="15" actId="20577"/>
+      <pc:docMkLst>
+        <pc:docMk/>
+      </pc:docMkLst>
+      <pc:sldChg chg="modSp">
+        <pc:chgData name="Lionel Tan Junzer" userId="04b849c6f1991e6b" providerId="LiveId" clId="{7BE287D8-C8B6-4690-B1A6-8638E82ECD98}" dt="2018-09-21T08:58:29.170" v="15" actId="20577"/>
+        <pc:sldMkLst>
+          <pc:docMk/>
+          <pc:sldMk cId="211586602" sldId="262"/>
+        </pc:sldMkLst>
+        <pc:spChg chg="mod">
+          <ac:chgData name="Lionel Tan Junzer" userId="04b849c6f1991e6b" providerId="LiveId" clId="{7BE287D8-C8B6-4690-B1A6-8638E82ECD98}" dt="2018-09-21T08:58:29.170" v="15" actId="20577"/>
+          <ac:spMkLst>
+            <pc:docMk/>
+            <pc:sldMk cId="211586602" sldId="262"/>
+            <ac:spMk id="16" creationId="{00000000-0000-0000-0000-000000000000}"/>
+          </ac:spMkLst>
+        </pc:spChg>
+      </pc:sldChg>
+    </pc:docChg>
+  </pc:docChgLst>
+</pc:chgInfo>
 </file>
 
 <file path=ppt/notesMasters/notesMaster1.xml><?xml version="1.0" encoding="utf-8"?>
@@ -212,7 +245,7 @@
           <a:p>
             <a:fld id="{F5CC4B3F-88C1-4FFA-B1B6-F41C21DC6924}" type="datetimeFigureOut">
               <a:rPr lang="en-US" smtClean="0"/>
-              <a:t>4/16/2018</a:t>
+              <a:t>9/21/2018</a:t>
             </a:fld>
             <a:endParaRPr lang="en-US"/>
           </a:p>
@@ -658,7 +691,7 @@
           <a:p>
             <a:fld id="{78C97017-6FC3-485B-9764-EAC9E56C1D49}" type="datetimeFigureOut">
               <a:rPr lang="en-US" smtClean="0"/>
-              <a:t>4/16/2018</a:t>
+              <a:t>9/21/2018</a:t>
             </a:fld>
             <a:endParaRPr lang="en-US"/>
           </a:p>
@@ -826,7 +859,7 @@
           <a:p>
             <a:fld id="{78C97017-6FC3-485B-9764-EAC9E56C1D49}" type="datetimeFigureOut">
               <a:rPr lang="en-US" smtClean="0"/>
-              <a:t>4/16/2018</a:t>
+              <a:t>9/21/2018</a:t>
             </a:fld>
             <a:endParaRPr lang="en-US"/>
           </a:p>
@@ -1004,7 +1037,7 @@
           <a:p>
             <a:fld id="{78C97017-6FC3-485B-9764-EAC9E56C1D49}" type="datetimeFigureOut">
               <a:rPr lang="en-US" smtClean="0"/>
-              <a:t>4/16/2018</a:t>
+              <a:t>9/21/2018</a:t>
             </a:fld>
             <a:endParaRPr lang="en-US"/>
           </a:p>
@@ -1172,7 +1205,7 @@
           <a:p>
             <a:fld id="{78C97017-6FC3-485B-9764-EAC9E56C1D49}" type="datetimeFigureOut">
               <a:rPr lang="en-US" smtClean="0"/>
-              <a:t>4/16/2018</a:t>
+              <a:t>9/21/2018</a:t>
             </a:fld>
             <a:endParaRPr lang="en-US"/>
           </a:p>
@@ -1417,7 +1450,7 @@
           <a:p>
             <a:fld id="{78C97017-6FC3-485B-9764-EAC9E56C1D49}" type="datetimeFigureOut">
               <a:rPr lang="en-US" smtClean="0"/>
-              <a:t>4/16/2018</a:t>
+              <a:t>9/21/2018</a:t>
             </a:fld>
             <a:endParaRPr lang="en-US"/>
           </a:p>
@@ -1702,7 +1735,7 @@
           <a:p>
             <a:fld id="{78C97017-6FC3-485B-9764-EAC9E56C1D49}" type="datetimeFigureOut">
               <a:rPr lang="en-US" smtClean="0"/>
-              <a:t>4/16/2018</a:t>
+              <a:t>9/21/2018</a:t>
             </a:fld>
             <a:endParaRPr lang="en-US"/>
           </a:p>
@@ -2121,7 +2154,7 @@
           <a:p>
             <a:fld id="{78C97017-6FC3-485B-9764-EAC9E56C1D49}" type="datetimeFigureOut">
               <a:rPr lang="en-US" smtClean="0"/>
-              <a:t>4/16/2018</a:t>
+              <a:t>9/21/2018</a:t>
             </a:fld>
             <a:endParaRPr lang="en-US"/>
           </a:p>
@@ -2238,7 +2271,7 @@
           <a:p>
             <a:fld id="{78C97017-6FC3-485B-9764-EAC9E56C1D49}" type="datetimeFigureOut">
               <a:rPr lang="en-US" smtClean="0"/>
-              <a:t>4/16/2018</a:t>
+              <a:t>9/21/2018</a:t>
             </a:fld>
             <a:endParaRPr lang="en-US"/>
           </a:p>
@@ -2333,7 +2366,7 @@
           <a:p>
             <a:fld id="{78C97017-6FC3-485B-9764-EAC9E56C1D49}" type="datetimeFigureOut">
               <a:rPr lang="en-US" smtClean="0"/>
-              <a:t>4/16/2018</a:t>
+              <a:t>9/21/2018</a:t>
             </a:fld>
             <a:endParaRPr lang="en-US"/>
           </a:p>
@@ -2608,7 +2641,7 @@
           <a:p>
             <a:fld id="{78C97017-6FC3-485B-9764-EAC9E56C1D49}" type="datetimeFigureOut">
               <a:rPr lang="en-US" smtClean="0"/>
-              <a:t>4/16/2018</a:t>
+              <a:t>9/21/2018</a:t>
             </a:fld>
             <a:endParaRPr lang="en-US"/>
           </a:p>
@@ -2860,7 +2893,7 @@
           <a:p>
             <a:fld id="{78C97017-6FC3-485B-9764-EAC9E56C1D49}" type="datetimeFigureOut">
               <a:rPr lang="en-US" smtClean="0"/>
-              <a:t>4/16/2018</a:t>
+              <a:t>9/21/2018</a:t>
             </a:fld>
             <a:endParaRPr lang="en-US"/>
           </a:p>
@@ -3071,7 +3104,7 @@
           <a:p>
             <a:fld id="{78C97017-6FC3-485B-9764-EAC9E56C1D49}" type="datetimeFigureOut">
               <a:rPr lang="en-US" smtClean="0"/>
-              <a:t>4/16/2018</a:t>
+              <a:t>9/21/2018</a:t>
             </a:fld>
             <a:endParaRPr lang="en-US"/>
           </a:p>
@@ -3607,7 +3640,7 @@
           <a:p>
             <a:pPr algn="ctr"/>
             <a:r>
-              <a:rPr lang="en-US" sz="1050" b="1" dirty="0" err="1" smtClean="0">
+              <a:rPr lang="en-US" sz="1050" b="1" dirty="0" err="1">
                 <a:solidFill>
                   <a:srgbClr val="0070C0"/>
                 </a:solidFill>
@@ -3939,18 +3972,13 @@
           <a:p>
             <a:pPr algn="ctr"/>
             <a:r>
-              <a:rPr lang="en-US" sz="1050" dirty="0" err="1" smtClean="0">
+              <a:rPr lang="en-US" sz="1050" dirty="0">
                 <a:solidFill>
                   <a:schemeClr val="bg1"/>
                 </a:solidFill>
               </a:rPr>
-              <a:t>AddressBook</a:t>
-            </a:r>
-            <a:endParaRPr lang="en-US" sz="1050" dirty="0">
-              <a:solidFill>
-                <a:schemeClr val="bg1"/>
-              </a:solidFill>
-            </a:endParaRPr>
+              <a:t>Spare</a:t>
+            </a:r>
           </a:p>
           <a:p>
             <a:pPr algn="ctr"/>
@@ -5815,7 +5843,7 @@
           <a:p>
             <a:pPr algn="ctr"/>
             <a:r>
-              <a:rPr lang="en-US" sz="1050" b="1" dirty="0" err="1" smtClean="0">
+              <a:rPr lang="en-US" sz="1050" b="1" dirty="0" err="1">
                 <a:solidFill>
                   <a:schemeClr val="bg1"/>
                 </a:solidFill>
@@ -6165,7 +6193,7 @@
           <a:p>
             <a:pPr algn="ctr"/>
             <a:r>
-              <a:rPr lang="en-US" sz="1050" dirty="0" err="1" smtClean="0">
+              <a:rPr lang="en-US" sz="1050" dirty="0" err="1">
                 <a:solidFill>
                   <a:schemeClr val="bg1"/>
                 </a:solidFill>
@@ -6173,7 +6201,7 @@
               <a:t>XYZCommand</a:t>
             </a:r>
             <a:r>
-              <a:rPr lang="en-US" sz="1050" dirty="0" smtClean="0">
+              <a:rPr lang="en-US" sz="1050" dirty="0">
                 <a:solidFill>
                   <a:schemeClr val="bg1"/>
                 </a:solidFill>
@@ -6181,7 +6209,7 @@
               <a:t> = </a:t>
             </a:r>
             <a:r>
-              <a:rPr lang="en-US" sz="1050" dirty="0" err="1" smtClean="0">
+              <a:rPr lang="en-US" sz="1050" dirty="0" err="1">
                 <a:solidFill>
                   <a:schemeClr val="bg1"/>
                 </a:solidFill>
@@ -6189,7 +6217,7 @@
               <a:t>AddCommand</a:t>
             </a:r>
             <a:r>
-              <a:rPr lang="en-US" sz="1050" dirty="0" smtClean="0">
+              <a:rPr lang="en-US" sz="1050" dirty="0">
                 <a:solidFill>
                   <a:schemeClr val="bg1"/>
                 </a:solidFill>
@@ -6197,7 +6225,7 @@
               <a:t>, </a:t>
             </a:r>
             <a:r>
-              <a:rPr lang="en-US" sz="1050" dirty="0" err="1" smtClean="0">
+              <a:rPr lang="en-US" sz="1050" dirty="0" err="1">
                 <a:solidFill>
                   <a:schemeClr val="bg1"/>
                 </a:solidFill>
@@ -6205,18 +6233,13 @@
               <a:t>FindCommand</a:t>
             </a:r>
             <a:r>
-              <a:rPr lang="en-US" sz="1050" dirty="0" smtClean="0">
+              <a:rPr lang="en-US" sz="1050" dirty="0">
                 <a:solidFill>
                   <a:schemeClr val="bg1"/>
                 </a:solidFill>
               </a:rPr>
               <a:t>, etc.</a:t>
             </a:r>
-            <a:endParaRPr lang="en-US" sz="1050" dirty="0">
-              <a:solidFill>
-                <a:schemeClr val="bg1"/>
-              </a:solidFill>
-            </a:endParaRPr>
           </a:p>
         </p:txBody>
       </p:sp>

</xml_diff>

<commit_message>
docs/diagrams/LogicComponentClassDiagram.pptx & docs/images/LogicClassDiagram.png: - Update "AddressBook" to "Scheduler"
</commit_message>
<xml_diff>
--- a/docs/diagrams/LogicComponentClassDiagram.pptx
+++ b/docs/diagrams/LogicComponentClassDiagram.pptx
@@ -126,10 +126,6 @@
 </p:presentation>
 </file>
 
-<file path=ppt/revisionInfo.xml><?xml version="1.0" encoding="utf-8"?>
-<p1510:revInfo xmlns:a="http://schemas.openxmlformats.org/drawingml/2006/main" xmlns:r="http://schemas.openxmlformats.org/officeDocument/2006/relationships" xmlns:p1510="http://schemas.microsoft.com/office/powerpoint/2015/10/main"/>
-</file>
-
 <file path=ppt/notesMasters/notesMaster1.xml><?xml version="1.0" encoding="utf-8"?>
 <p:notesMaster xmlns:a="http://schemas.openxmlformats.org/drawingml/2006/main" xmlns:r="http://schemas.openxmlformats.org/officeDocument/2006/relationships" xmlns:p="http://schemas.openxmlformats.org/presentationml/2006/main">
   <p:cSld>
@@ -212,7 +208,7 @@
           <a:p>
             <a:fld id="{F5CC4B3F-88C1-4FFA-B1B6-F41C21DC6924}" type="datetimeFigureOut">
               <a:rPr lang="en-US" smtClean="0"/>
-              <a:t>4/16/2018</a:t>
+              <a:t>10/24/2018</a:t>
             </a:fld>
             <a:endParaRPr lang="en-US"/>
           </a:p>
@@ -479,6 +475,90 @@
 </p:notesMaster>
 </file>
 
+<file path=ppt/notesSlides/notesSlide1.xml><?xml version="1.0" encoding="utf-8"?>
+<p:notes xmlns:a="http://schemas.openxmlformats.org/drawingml/2006/main" xmlns:r="http://schemas.openxmlformats.org/officeDocument/2006/relationships" xmlns:p="http://schemas.openxmlformats.org/presentationml/2006/main">
+  <p:cSld>
+    <p:spTree>
+      <p:nvGrpSpPr>
+        <p:cNvPr id="1" name=""/>
+        <p:cNvGrpSpPr/>
+        <p:nvPr/>
+      </p:nvGrpSpPr>
+      <p:grpSpPr>
+        <a:xfrm>
+          <a:off x="0" y="0"/>
+          <a:ext cx="0" cy="0"/>
+          <a:chOff x="0" y="0"/>
+          <a:chExt cx="0" cy="0"/>
+        </a:xfrm>
+      </p:grpSpPr>
+      <p:sp>
+        <p:nvSpPr>
+          <p:cNvPr id="2" name="Slide Image Placeholder 1"/>
+          <p:cNvSpPr>
+            <a:spLocks noGrp="1" noRot="1" noChangeAspect="1"/>
+          </p:cNvSpPr>
+          <p:nvPr>
+            <p:ph type="sldImg"/>
+          </p:nvPr>
+        </p:nvSpPr>
+        <p:spPr/>
+      </p:sp>
+      <p:sp>
+        <p:nvSpPr>
+          <p:cNvPr id="3" name="Notes Placeholder 2"/>
+          <p:cNvSpPr>
+            <a:spLocks noGrp="1"/>
+          </p:cNvSpPr>
+          <p:nvPr>
+            <p:ph type="body" idx="1"/>
+          </p:nvPr>
+        </p:nvSpPr>
+        <p:spPr/>
+        <p:txBody>
+          <a:bodyPr/>
+          <a:lstStyle/>
+          <a:p>
+            <a:endParaRPr lang="en-SG" dirty="0"/>
+          </a:p>
+        </p:txBody>
+      </p:sp>
+      <p:sp>
+        <p:nvSpPr>
+          <p:cNvPr id="4" name="Slide Number Placeholder 3"/>
+          <p:cNvSpPr>
+            <a:spLocks noGrp="1"/>
+          </p:cNvSpPr>
+          <p:nvPr>
+            <p:ph type="sldNum" sz="quarter" idx="5"/>
+          </p:nvPr>
+        </p:nvSpPr>
+        <p:spPr/>
+        <p:txBody>
+          <a:bodyPr/>
+          <a:lstStyle/>
+          <a:p>
+            <a:fld id="{5A7AB025-77E3-4BD1-A2FD-B3183DBA47A3}" type="slidenum">
+              <a:rPr lang="en-US" smtClean="0"/>
+              <a:t>1</a:t>
+            </a:fld>
+            <a:endParaRPr lang="en-US"/>
+          </a:p>
+        </p:txBody>
+      </p:sp>
+    </p:spTree>
+    <p:extLst>
+      <p:ext uri="{BB962C8B-B14F-4D97-AF65-F5344CB8AC3E}">
+        <p14:creationId xmlns:p14="http://schemas.microsoft.com/office/powerpoint/2010/main" val="2682370795"/>
+      </p:ext>
+    </p:extLst>
+  </p:cSld>
+  <p:clrMapOvr>
+    <a:masterClrMapping/>
+  </p:clrMapOvr>
+</p:notes>
+</file>
+
 <file path=ppt/slideLayouts/slideLayout1.xml><?xml version="1.0" encoding="utf-8"?>
 <p:sldLayout xmlns:a="http://schemas.openxmlformats.org/drawingml/2006/main" xmlns:r="http://schemas.openxmlformats.org/officeDocument/2006/relationships" xmlns:p="http://schemas.openxmlformats.org/presentationml/2006/main" type="title" preserve="1">
   <p:cSld name="Title Slide">
@@ -658,7 +738,7 @@
           <a:p>
             <a:fld id="{78C97017-6FC3-485B-9764-EAC9E56C1D49}" type="datetimeFigureOut">
               <a:rPr lang="en-US" smtClean="0"/>
-              <a:t>4/16/2018</a:t>
+              <a:t>10/24/2018</a:t>
             </a:fld>
             <a:endParaRPr lang="en-US"/>
           </a:p>
@@ -826,7 +906,7 @@
           <a:p>
             <a:fld id="{78C97017-6FC3-485B-9764-EAC9E56C1D49}" type="datetimeFigureOut">
               <a:rPr lang="en-US" smtClean="0"/>
-              <a:t>4/16/2018</a:t>
+              <a:t>10/24/2018</a:t>
             </a:fld>
             <a:endParaRPr lang="en-US"/>
           </a:p>
@@ -1004,7 +1084,7 @@
           <a:p>
             <a:fld id="{78C97017-6FC3-485B-9764-EAC9E56C1D49}" type="datetimeFigureOut">
               <a:rPr lang="en-US" smtClean="0"/>
-              <a:t>4/16/2018</a:t>
+              <a:t>10/24/2018</a:t>
             </a:fld>
             <a:endParaRPr lang="en-US"/>
           </a:p>
@@ -1172,7 +1252,7 @@
           <a:p>
             <a:fld id="{78C97017-6FC3-485B-9764-EAC9E56C1D49}" type="datetimeFigureOut">
               <a:rPr lang="en-US" smtClean="0"/>
-              <a:t>4/16/2018</a:t>
+              <a:t>10/24/2018</a:t>
             </a:fld>
             <a:endParaRPr lang="en-US"/>
           </a:p>
@@ -1417,7 +1497,7 @@
           <a:p>
             <a:fld id="{78C97017-6FC3-485B-9764-EAC9E56C1D49}" type="datetimeFigureOut">
               <a:rPr lang="en-US" smtClean="0"/>
-              <a:t>4/16/2018</a:t>
+              <a:t>10/24/2018</a:t>
             </a:fld>
             <a:endParaRPr lang="en-US"/>
           </a:p>
@@ -1702,7 +1782,7 @@
           <a:p>
             <a:fld id="{78C97017-6FC3-485B-9764-EAC9E56C1D49}" type="datetimeFigureOut">
               <a:rPr lang="en-US" smtClean="0"/>
-              <a:t>4/16/2018</a:t>
+              <a:t>10/24/2018</a:t>
             </a:fld>
             <a:endParaRPr lang="en-US"/>
           </a:p>
@@ -2121,7 +2201,7 @@
           <a:p>
             <a:fld id="{78C97017-6FC3-485B-9764-EAC9E56C1D49}" type="datetimeFigureOut">
               <a:rPr lang="en-US" smtClean="0"/>
-              <a:t>4/16/2018</a:t>
+              <a:t>10/24/2018</a:t>
             </a:fld>
             <a:endParaRPr lang="en-US"/>
           </a:p>
@@ -2238,7 +2318,7 @@
           <a:p>
             <a:fld id="{78C97017-6FC3-485B-9764-EAC9E56C1D49}" type="datetimeFigureOut">
               <a:rPr lang="en-US" smtClean="0"/>
-              <a:t>4/16/2018</a:t>
+              <a:t>10/24/2018</a:t>
             </a:fld>
             <a:endParaRPr lang="en-US"/>
           </a:p>
@@ -2333,7 +2413,7 @@
           <a:p>
             <a:fld id="{78C97017-6FC3-485B-9764-EAC9E56C1D49}" type="datetimeFigureOut">
               <a:rPr lang="en-US" smtClean="0"/>
-              <a:t>4/16/2018</a:t>
+              <a:t>10/24/2018</a:t>
             </a:fld>
             <a:endParaRPr lang="en-US"/>
           </a:p>
@@ -2608,7 +2688,7 @@
           <a:p>
             <a:fld id="{78C97017-6FC3-485B-9764-EAC9E56C1D49}" type="datetimeFigureOut">
               <a:rPr lang="en-US" smtClean="0"/>
-              <a:t>4/16/2018</a:t>
+              <a:t>10/24/2018</a:t>
             </a:fld>
             <a:endParaRPr lang="en-US"/>
           </a:p>
@@ -2860,7 +2940,7 @@
           <a:p>
             <a:fld id="{78C97017-6FC3-485B-9764-EAC9E56C1D49}" type="datetimeFigureOut">
               <a:rPr lang="en-US" smtClean="0"/>
-              <a:t>4/16/2018</a:t>
+              <a:t>10/24/2018</a:t>
             </a:fld>
             <a:endParaRPr lang="en-US"/>
           </a:p>
@@ -3071,7 +3151,7 @@
           <a:p>
             <a:fld id="{78C97017-6FC3-485B-9764-EAC9E56C1D49}" type="datetimeFigureOut">
               <a:rPr lang="en-US" smtClean="0"/>
-              <a:t>4/16/2018</a:t>
+              <a:t>10/24/2018</a:t>
             </a:fld>
             <a:endParaRPr lang="en-US"/>
           </a:p>
@@ -3607,7 +3687,7 @@
           <a:p>
             <a:pPr algn="ctr"/>
             <a:r>
-              <a:rPr lang="en-US" sz="1050" b="1" dirty="0" err="1" smtClean="0">
+              <a:rPr lang="en-US" sz="1050" b="1" dirty="0" err="1">
                 <a:solidFill>
                   <a:srgbClr val="0070C0"/>
                 </a:solidFill>
@@ -3939,18 +4019,13 @@
           <a:p>
             <a:pPr algn="ctr"/>
             <a:r>
-              <a:rPr lang="en-US" sz="1050" dirty="0" err="1" smtClean="0">
+              <a:rPr lang="en-US" sz="1050" dirty="0">
                 <a:solidFill>
                   <a:schemeClr val="bg1"/>
                 </a:solidFill>
               </a:rPr>
-              <a:t>AddressBook</a:t>
-            </a:r>
-            <a:endParaRPr lang="en-US" sz="1050" dirty="0">
-              <a:solidFill>
-                <a:schemeClr val="bg1"/>
-              </a:solidFill>
-            </a:endParaRPr>
+              <a:t>Scheduler</a:t>
+            </a:r>
           </a:p>
           <a:p>
             <a:pPr algn="ctr"/>
@@ -5815,7 +5890,7 @@
           <a:p>
             <a:pPr algn="ctr"/>
             <a:r>
-              <a:rPr lang="en-US" sz="1050" b="1" dirty="0" err="1" smtClean="0">
+              <a:rPr lang="en-US" sz="1050" b="1" dirty="0" err="1">
                 <a:solidFill>
                   <a:schemeClr val="bg1"/>
                 </a:solidFill>
@@ -6165,7 +6240,7 @@
           <a:p>
             <a:pPr algn="ctr"/>
             <a:r>
-              <a:rPr lang="en-US" sz="1050" dirty="0" err="1" smtClean="0">
+              <a:rPr lang="en-US" sz="1050" dirty="0" err="1">
                 <a:solidFill>
                   <a:schemeClr val="bg1"/>
                 </a:solidFill>
@@ -6173,7 +6248,7 @@
               <a:t>XYZCommand</a:t>
             </a:r>
             <a:r>
-              <a:rPr lang="en-US" sz="1050" dirty="0" smtClean="0">
+              <a:rPr lang="en-US" sz="1050" dirty="0">
                 <a:solidFill>
                   <a:schemeClr val="bg1"/>
                 </a:solidFill>
@@ -6181,7 +6256,7 @@
               <a:t> = </a:t>
             </a:r>
             <a:r>
-              <a:rPr lang="en-US" sz="1050" dirty="0" err="1" smtClean="0">
+              <a:rPr lang="en-US" sz="1050" dirty="0" err="1">
                 <a:solidFill>
                   <a:schemeClr val="bg1"/>
                 </a:solidFill>
@@ -6189,7 +6264,7 @@
               <a:t>AddCommand</a:t>
             </a:r>
             <a:r>
-              <a:rPr lang="en-US" sz="1050" dirty="0" smtClean="0">
+              <a:rPr lang="en-US" sz="1050" dirty="0">
                 <a:solidFill>
                   <a:schemeClr val="bg1"/>
                 </a:solidFill>
@@ -6197,7 +6272,7 @@
               <a:t>, </a:t>
             </a:r>
             <a:r>
-              <a:rPr lang="en-US" sz="1050" dirty="0" err="1" smtClean="0">
+              <a:rPr lang="en-US" sz="1050" dirty="0" err="1">
                 <a:solidFill>
                   <a:schemeClr val="bg1"/>
                 </a:solidFill>
@@ -6205,18 +6280,13 @@
               <a:t>FindCommand</a:t>
             </a:r>
             <a:r>
-              <a:rPr lang="en-US" sz="1050" dirty="0" smtClean="0">
+              <a:rPr lang="en-US" sz="1050" dirty="0">
                 <a:solidFill>
                   <a:schemeClr val="bg1"/>
                 </a:solidFill>
               </a:rPr>
               <a:t>, etc.</a:t>
             </a:r>
-            <a:endParaRPr lang="en-US" sz="1050" dirty="0">
-              <a:solidFill>
-                <a:schemeClr val="bg1"/>
-              </a:solidFill>
-            </a:endParaRPr>
           </a:p>
         </p:txBody>
       </p:sp>

</xml_diff>

<commit_message>
Update DG for logic, model and ui component
</commit_message>
<xml_diff>
--- a/docs/diagrams/LogicComponentClassDiagram.pptx
+++ b/docs/diagrams/LogicComponentClassDiagram.pptx
@@ -126,10 +126,6 @@
 </p:presentation>
 </file>
 
-<file path=ppt/revisionInfo.xml><?xml version="1.0" encoding="utf-8"?>
-<p1510:revInfo xmlns:a="http://schemas.openxmlformats.org/drawingml/2006/main" xmlns:r="http://schemas.openxmlformats.org/officeDocument/2006/relationships" xmlns:p1510="http://schemas.microsoft.com/office/powerpoint/2015/10/main"/>
-</file>
-
 <file path=ppt/notesMasters/notesMaster1.xml><?xml version="1.0" encoding="utf-8"?>
 <p:notesMaster xmlns:a="http://schemas.openxmlformats.org/drawingml/2006/main" xmlns:r="http://schemas.openxmlformats.org/officeDocument/2006/relationships" xmlns:p="http://schemas.openxmlformats.org/presentationml/2006/main">
   <p:cSld>
@@ -212,7 +208,7 @@
           <a:p>
             <a:fld id="{F5CC4B3F-88C1-4FFA-B1B6-F41C21DC6924}" type="datetimeFigureOut">
               <a:rPr lang="en-US" smtClean="0"/>
-              <a:t>4/16/2018</a:t>
+              <a:t>11/7/2018</a:t>
             </a:fld>
             <a:endParaRPr lang="en-US"/>
           </a:p>
@@ -658,7 +654,7 @@
           <a:p>
             <a:fld id="{78C97017-6FC3-485B-9764-EAC9E56C1D49}" type="datetimeFigureOut">
               <a:rPr lang="en-US" smtClean="0"/>
-              <a:t>4/16/2018</a:t>
+              <a:t>11/7/2018</a:t>
             </a:fld>
             <a:endParaRPr lang="en-US"/>
           </a:p>
@@ -826,7 +822,7 @@
           <a:p>
             <a:fld id="{78C97017-6FC3-485B-9764-EAC9E56C1D49}" type="datetimeFigureOut">
               <a:rPr lang="en-US" smtClean="0"/>
-              <a:t>4/16/2018</a:t>
+              <a:t>11/7/2018</a:t>
             </a:fld>
             <a:endParaRPr lang="en-US"/>
           </a:p>
@@ -1004,7 +1000,7 @@
           <a:p>
             <a:fld id="{78C97017-6FC3-485B-9764-EAC9E56C1D49}" type="datetimeFigureOut">
               <a:rPr lang="en-US" smtClean="0"/>
-              <a:t>4/16/2018</a:t>
+              <a:t>11/7/2018</a:t>
             </a:fld>
             <a:endParaRPr lang="en-US"/>
           </a:p>
@@ -1172,7 +1168,7 @@
           <a:p>
             <a:fld id="{78C97017-6FC3-485B-9764-EAC9E56C1D49}" type="datetimeFigureOut">
               <a:rPr lang="en-US" smtClean="0"/>
-              <a:t>4/16/2018</a:t>
+              <a:t>11/7/2018</a:t>
             </a:fld>
             <a:endParaRPr lang="en-US"/>
           </a:p>
@@ -1417,7 +1413,7 @@
           <a:p>
             <a:fld id="{78C97017-6FC3-485B-9764-EAC9E56C1D49}" type="datetimeFigureOut">
               <a:rPr lang="en-US" smtClean="0"/>
-              <a:t>4/16/2018</a:t>
+              <a:t>11/7/2018</a:t>
             </a:fld>
             <a:endParaRPr lang="en-US"/>
           </a:p>
@@ -1702,7 +1698,7 @@
           <a:p>
             <a:fld id="{78C97017-6FC3-485B-9764-EAC9E56C1D49}" type="datetimeFigureOut">
               <a:rPr lang="en-US" smtClean="0"/>
-              <a:t>4/16/2018</a:t>
+              <a:t>11/7/2018</a:t>
             </a:fld>
             <a:endParaRPr lang="en-US"/>
           </a:p>
@@ -2121,7 +2117,7 @@
           <a:p>
             <a:fld id="{78C97017-6FC3-485B-9764-EAC9E56C1D49}" type="datetimeFigureOut">
               <a:rPr lang="en-US" smtClean="0"/>
-              <a:t>4/16/2018</a:t>
+              <a:t>11/7/2018</a:t>
             </a:fld>
             <a:endParaRPr lang="en-US"/>
           </a:p>
@@ -2238,7 +2234,7 @@
           <a:p>
             <a:fld id="{78C97017-6FC3-485B-9764-EAC9E56C1D49}" type="datetimeFigureOut">
               <a:rPr lang="en-US" smtClean="0"/>
-              <a:t>4/16/2018</a:t>
+              <a:t>11/7/2018</a:t>
             </a:fld>
             <a:endParaRPr lang="en-US"/>
           </a:p>
@@ -2333,7 +2329,7 @@
           <a:p>
             <a:fld id="{78C97017-6FC3-485B-9764-EAC9E56C1D49}" type="datetimeFigureOut">
               <a:rPr lang="en-US" smtClean="0"/>
-              <a:t>4/16/2018</a:t>
+              <a:t>11/7/2018</a:t>
             </a:fld>
             <a:endParaRPr lang="en-US"/>
           </a:p>
@@ -2608,7 +2604,7 @@
           <a:p>
             <a:fld id="{78C97017-6FC3-485B-9764-EAC9E56C1D49}" type="datetimeFigureOut">
               <a:rPr lang="en-US" smtClean="0"/>
-              <a:t>4/16/2018</a:t>
+              <a:t>11/7/2018</a:t>
             </a:fld>
             <a:endParaRPr lang="en-US"/>
           </a:p>
@@ -2860,7 +2856,7 @@
           <a:p>
             <a:fld id="{78C97017-6FC3-485B-9764-EAC9E56C1D49}" type="datetimeFigureOut">
               <a:rPr lang="en-US" smtClean="0"/>
-              <a:t>4/16/2018</a:t>
+              <a:t>11/7/2018</a:t>
             </a:fld>
             <a:endParaRPr lang="en-US"/>
           </a:p>
@@ -3071,7 +3067,7 @@
           <a:p>
             <a:fld id="{78C97017-6FC3-485B-9764-EAC9E56C1D49}" type="datetimeFigureOut">
               <a:rPr lang="en-US" smtClean="0"/>
-              <a:t>4/16/2018</a:t>
+              <a:t>11/7/2018</a:t>
             </a:fld>
             <a:endParaRPr lang="en-US"/>
           </a:p>
@@ -3607,7 +3603,7 @@
           <a:p>
             <a:pPr algn="ctr"/>
             <a:r>
-              <a:rPr lang="en-US" sz="1050" b="1" dirty="0" err="1" smtClean="0">
+              <a:rPr lang="en-US" sz="1050" b="1" dirty="0" err="1">
                 <a:solidFill>
                   <a:srgbClr val="0070C0"/>
                 </a:solidFill>
@@ -3939,12 +3935,12 @@
           <a:p>
             <a:pPr algn="ctr"/>
             <a:r>
-              <a:rPr lang="en-US" sz="1050" dirty="0" err="1" smtClean="0">
+              <a:rPr lang="en-US" sz="1050" dirty="0" err="1">
                 <a:solidFill>
                   <a:schemeClr val="bg1"/>
                 </a:solidFill>
               </a:rPr>
-              <a:t>AddressBook</a:t>
+              <a:t>Piconso</a:t>
             </a:r>
             <a:endParaRPr lang="en-US" sz="1050" dirty="0">
               <a:solidFill>
@@ -5815,7 +5811,7 @@
           <a:p>
             <a:pPr algn="ctr"/>
             <a:r>
-              <a:rPr lang="en-US" sz="1050" b="1" dirty="0" err="1" smtClean="0">
+              <a:rPr lang="en-US" sz="1050" b="1" dirty="0" err="1">
                 <a:solidFill>
                   <a:schemeClr val="bg1"/>
                 </a:solidFill>
@@ -6165,7 +6161,7 @@
           <a:p>
             <a:pPr algn="ctr"/>
             <a:r>
-              <a:rPr lang="en-US" sz="1050" dirty="0" err="1" smtClean="0">
+              <a:rPr lang="en-US" sz="1050" dirty="0" err="1">
                 <a:solidFill>
                   <a:schemeClr val="bg1"/>
                 </a:solidFill>
@@ -6173,7 +6169,7 @@
               <a:t>XYZCommand</a:t>
             </a:r>
             <a:r>
-              <a:rPr lang="en-US" sz="1050" dirty="0" smtClean="0">
+              <a:rPr lang="en-US" sz="1050" dirty="0">
                 <a:solidFill>
                   <a:schemeClr val="bg1"/>
                 </a:solidFill>
@@ -6181,7 +6177,7 @@
               <a:t> = </a:t>
             </a:r>
             <a:r>
-              <a:rPr lang="en-US" sz="1050" dirty="0" err="1" smtClean="0">
+              <a:rPr lang="en-US" sz="1050" dirty="0" err="1">
                 <a:solidFill>
                   <a:schemeClr val="bg1"/>
                 </a:solidFill>
@@ -6189,7 +6185,7 @@
               <a:t>AddCommand</a:t>
             </a:r>
             <a:r>
-              <a:rPr lang="en-US" sz="1050" dirty="0" smtClean="0">
+              <a:rPr lang="en-US" sz="1050" dirty="0">
                 <a:solidFill>
                   <a:schemeClr val="bg1"/>
                 </a:solidFill>
@@ -6197,7 +6193,7 @@
               <a:t>, </a:t>
             </a:r>
             <a:r>
-              <a:rPr lang="en-US" sz="1050" dirty="0" err="1" smtClean="0">
+              <a:rPr lang="en-US" sz="1050" dirty="0" err="1">
                 <a:solidFill>
                   <a:schemeClr val="bg1"/>
                 </a:solidFill>
@@ -6205,18 +6201,13 @@
               <a:t>FindCommand</a:t>
             </a:r>
             <a:r>
-              <a:rPr lang="en-US" sz="1050" dirty="0" smtClean="0">
+              <a:rPr lang="en-US" sz="1050" dirty="0">
                 <a:solidFill>
                   <a:schemeClr val="bg1"/>
                 </a:solidFill>
               </a:rPr>
               <a:t>, etc.</a:t>
             </a:r>
-            <a:endParaRPr lang="en-US" sz="1050" dirty="0">
-              <a:solidFill>
-                <a:schemeClr val="bg1"/>
-              </a:solidFill>
-            </a:endParaRPr>
           </a:p>
         </p:txBody>
       </p:sp>

</xml_diff>

<commit_message>
Changes to logic component of developer guide
</commit_message>
<xml_diff>
--- a/docs/diagrams/LogicComponentClassDiagram.pptx
+++ b/docs/diagrams/LogicComponentClassDiagram.pptx
@@ -212,7 +212,7 @@
           <a:p>
             <a:fld id="{F5CC4B3F-88C1-4FFA-B1B6-F41C21DC6924}" type="datetimeFigureOut">
               <a:rPr lang="en-US" smtClean="0"/>
-              <a:t>4/16/2018</a:t>
+              <a:t>11/11/2018</a:t>
             </a:fld>
             <a:endParaRPr lang="en-US"/>
           </a:p>
@@ -658,7 +658,7 @@
           <a:p>
             <a:fld id="{78C97017-6FC3-485B-9764-EAC9E56C1D49}" type="datetimeFigureOut">
               <a:rPr lang="en-US" smtClean="0"/>
-              <a:t>4/16/2018</a:t>
+              <a:t>11/11/2018</a:t>
             </a:fld>
             <a:endParaRPr lang="en-US"/>
           </a:p>
@@ -826,7 +826,7 @@
           <a:p>
             <a:fld id="{78C97017-6FC3-485B-9764-EAC9E56C1D49}" type="datetimeFigureOut">
               <a:rPr lang="en-US" smtClean="0"/>
-              <a:t>4/16/2018</a:t>
+              <a:t>11/11/2018</a:t>
             </a:fld>
             <a:endParaRPr lang="en-US"/>
           </a:p>
@@ -1004,7 +1004,7 @@
           <a:p>
             <a:fld id="{78C97017-6FC3-485B-9764-EAC9E56C1D49}" type="datetimeFigureOut">
               <a:rPr lang="en-US" smtClean="0"/>
-              <a:t>4/16/2018</a:t>
+              <a:t>11/11/2018</a:t>
             </a:fld>
             <a:endParaRPr lang="en-US"/>
           </a:p>
@@ -1172,7 +1172,7 @@
           <a:p>
             <a:fld id="{78C97017-6FC3-485B-9764-EAC9E56C1D49}" type="datetimeFigureOut">
               <a:rPr lang="en-US" smtClean="0"/>
-              <a:t>4/16/2018</a:t>
+              <a:t>11/11/2018</a:t>
             </a:fld>
             <a:endParaRPr lang="en-US"/>
           </a:p>
@@ -1417,7 +1417,7 @@
           <a:p>
             <a:fld id="{78C97017-6FC3-485B-9764-EAC9E56C1D49}" type="datetimeFigureOut">
               <a:rPr lang="en-US" smtClean="0"/>
-              <a:t>4/16/2018</a:t>
+              <a:t>11/11/2018</a:t>
             </a:fld>
             <a:endParaRPr lang="en-US"/>
           </a:p>
@@ -1702,7 +1702,7 @@
           <a:p>
             <a:fld id="{78C97017-6FC3-485B-9764-EAC9E56C1D49}" type="datetimeFigureOut">
               <a:rPr lang="en-US" smtClean="0"/>
-              <a:t>4/16/2018</a:t>
+              <a:t>11/11/2018</a:t>
             </a:fld>
             <a:endParaRPr lang="en-US"/>
           </a:p>
@@ -2121,7 +2121,7 @@
           <a:p>
             <a:fld id="{78C97017-6FC3-485B-9764-EAC9E56C1D49}" type="datetimeFigureOut">
               <a:rPr lang="en-US" smtClean="0"/>
-              <a:t>4/16/2018</a:t>
+              <a:t>11/11/2018</a:t>
             </a:fld>
             <a:endParaRPr lang="en-US"/>
           </a:p>
@@ -2238,7 +2238,7 @@
           <a:p>
             <a:fld id="{78C97017-6FC3-485B-9764-EAC9E56C1D49}" type="datetimeFigureOut">
               <a:rPr lang="en-US" smtClean="0"/>
-              <a:t>4/16/2018</a:t>
+              <a:t>11/11/2018</a:t>
             </a:fld>
             <a:endParaRPr lang="en-US"/>
           </a:p>
@@ -2333,7 +2333,7 @@
           <a:p>
             <a:fld id="{78C97017-6FC3-485B-9764-EAC9E56C1D49}" type="datetimeFigureOut">
               <a:rPr lang="en-US" smtClean="0"/>
-              <a:t>4/16/2018</a:t>
+              <a:t>11/11/2018</a:t>
             </a:fld>
             <a:endParaRPr lang="en-US"/>
           </a:p>
@@ -2608,7 +2608,7 @@
           <a:p>
             <a:fld id="{78C97017-6FC3-485B-9764-EAC9E56C1D49}" type="datetimeFigureOut">
               <a:rPr lang="en-US" smtClean="0"/>
-              <a:t>4/16/2018</a:t>
+              <a:t>11/11/2018</a:t>
             </a:fld>
             <a:endParaRPr lang="en-US"/>
           </a:p>
@@ -2860,7 +2860,7 @@
           <a:p>
             <a:fld id="{78C97017-6FC3-485B-9764-EAC9E56C1D49}" type="datetimeFigureOut">
               <a:rPr lang="en-US" smtClean="0"/>
-              <a:t>4/16/2018</a:t>
+              <a:t>11/11/2018</a:t>
             </a:fld>
             <a:endParaRPr lang="en-US"/>
           </a:p>
@@ -3071,7 +3071,7 @@
           <a:p>
             <a:fld id="{78C97017-6FC3-485B-9764-EAC9E56C1D49}" type="datetimeFigureOut">
               <a:rPr lang="en-US" smtClean="0"/>
-              <a:t>4/16/2018</a:t>
+              <a:t>11/11/2018</a:t>
             </a:fld>
             <a:endParaRPr lang="en-US"/>
           </a:p>
@@ -3939,12 +3939,12 @@
           <a:p>
             <a:pPr algn="ctr"/>
             <a:r>
-              <a:rPr lang="en-US" sz="1050" dirty="0" err="1" smtClean="0">
+              <a:rPr lang="en-US" sz="1050" dirty="0" smtClean="0">
                 <a:solidFill>
                   <a:schemeClr val="bg1"/>
                 </a:solidFill>
               </a:rPr>
-              <a:t>AddressBook</a:t>
+              <a:t>Transcript</a:t>
             </a:r>
             <a:endParaRPr lang="en-US" sz="1050" dirty="0">
               <a:solidFill>
@@ -4584,14 +4584,14 @@
       </p:cxnSp>
       <p:sp>
         <p:nvSpPr>
-          <p:cNvPr id="56" name="Rectangle 62"/>
+          <p:cNvPr id="60" name="Rectangle 62"/>
           <p:cNvSpPr/>
           <p:nvPr/>
         </p:nvSpPr>
         <p:spPr>
           <a:xfrm>
-            <a:off x="3174214" y="1862795"/>
-            <a:ext cx="751107" cy="346760"/>
+            <a:off x="2876130" y="2841725"/>
+            <a:ext cx="1041832" cy="283820"/>
           </a:xfrm>
           <a:prstGeom prst="rect">
             <a:avLst/>
@@ -4632,27 +4632,12 @@
           <a:p>
             <a:pPr algn="ctr"/>
             <a:r>
-              <a:rPr lang="en-US" sz="1050">
+              <a:rPr lang="en-SG" sz="1050" dirty="0" err="1">
                 <a:solidFill>
                   <a:schemeClr val="bg1"/>
                 </a:solidFill>
               </a:rPr>
-              <a:t>Argument</a:t>
-            </a:r>
-            <a:br>
-              <a:rPr lang="en-US" sz="1050">
-                <a:solidFill>
-                  <a:schemeClr val="bg1"/>
-                </a:solidFill>
-              </a:rPr>
-            </a:br>
-            <a:r>
-              <a:rPr lang="en-US" sz="1050">
-                <a:solidFill>
-                  <a:schemeClr val="bg1"/>
-                </a:solidFill>
-              </a:rPr>
-              <a:t>Tokenizer</a:t>
+              <a:t>CliSyntax</a:t>
             </a:r>
             <a:endParaRPr lang="en-SG" sz="1050" dirty="0">
               <a:solidFill>
@@ -4664,14 +4649,14 @@
       </p:sp>
       <p:sp>
         <p:nvSpPr>
-          <p:cNvPr id="58" name="Rectangle 62"/>
+          <p:cNvPr id="62" name="Rectangle 62"/>
           <p:cNvSpPr/>
           <p:nvPr/>
         </p:nvSpPr>
         <p:spPr>
           <a:xfrm>
-            <a:off x="2238496" y="2454481"/>
-            <a:ext cx="726243" cy="174580"/>
+            <a:off x="2876130" y="3190882"/>
+            <a:ext cx="1041832" cy="283820"/>
           </a:xfrm>
           <a:prstGeom prst="rect">
             <a:avLst/>
@@ -4712,136 +4697,6 @@
           <a:p>
             <a:pPr algn="ctr"/>
             <a:r>
-              <a:rPr lang="en-US" sz="1050" dirty="0">
-                <a:solidFill>
-                  <a:schemeClr val="bg1"/>
-                </a:solidFill>
-              </a:rPr>
-              <a:t>Prefix</a:t>
-            </a:r>
-            <a:endParaRPr lang="en-SG" sz="1050" dirty="0">
-              <a:solidFill>
-                <a:schemeClr val="bg1"/>
-              </a:solidFill>
-            </a:endParaRPr>
-          </a:p>
-        </p:txBody>
-      </p:sp>
-      <p:sp>
-        <p:nvSpPr>
-          <p:cNvPr id="60" name="Rectangle 62"/>
-          <p:cNvSpPr/>
-          <p:nvPr/>
-        </p:nvSpPr>
-        <p:spPr>
-          <a:xfrm>
-            <a:off x="3186326" y="2841725"/>
-            <a:ext cx="731636" cy="283820"/>
-          </a:xfrm>
-          <a:prstGeom prst="rect">
-            <a:avLst/>
-          </a:prstGeom>
-          <a:solidFill>
-            <a:schemeClr val="accent5">
-              <a:lumMod val="60000"/>
-              <a:lumOff val="40000"/>
-            </a:schemeClr>
-          </a:solidFill>
-          <a:ln w="19050">
-            <a:solidFill>
-              <a:schemeClr val="accent5">
-                <a:lumMod val="60000"/>
-                <a:lumOff val="40000"/>
-              </a:schemeClr>
-            </a:solidFill>
-          </a:ln>
-          <a:effectLst/>
-        </p:spPr>
-        <p:style>
-          <a:lnRef idx="1">
-            <a:schemeClr val="accent2"/>
-          </a:lnRef>
-          <a:fillRef idx="2">
-            <a:schemeClr val="accent2"/>
-          </a:fillRef>
-          <a:effectRef idx="1">
-            <a:schemeClr val="accent2"/>
-          </a:effectRef>
-          <a:fontRef idx="minor">
-            <a:schemeClr val="dk1"/>
-          </a:fontRef>
-        </p:style>
-        <p:txBody>
-          <a:bodyPr rtlCol="0" anchor="ctr"/>
-          <a:lstStyle/>
-          <a:p>
-            <a:pPr algn="ctr"/>
-            <a:r>
-              <a:rPr lang="en-SG" sz="1050" dirty="0" err="1">
-                <a:solidFill>
-                  <a:schemeClr val="bg1"/>
-                </a:solidFill>
-              </a:rPr>
-              <a:t>CliSyntax</a:t>
-            </a:r>
-            <a:endParaRPr lang="en-SG" sz="1050" dirty="0">
-              <a:solidFill>
-                <a:schemeClr val="bg1"/>
-              </a:solidFill>
-            </a:endParaRPr>
-          </a:p>
-        </p:txBody>
-      </p:sp>
-      <p:sp>
-        <p:nvSpPr>
-          <p:cNvPr id="62" name="Rectangle 62"/>
-          <p:cNvSpPr/>
-          <p:nvPr/>
-        </p:nvSpPr>
-        <p:spPr>
-          <a:xfrm>
-            <a:off x="3186326" y="3190882"/>
-            <a:ext cx="731636" cy="283820"/>
-          </a:xfrm>
-          <a:prstGeom prst="rect">
-            <a:avLst/>
-          </a:prstGeom>
-          <a:solidFill>
-            <a:schemeClr val="accent5">
-              <a:lumMod val="60000"/>
-              <a:lumOff val="40000"/>
-            </a:schemeClr>
-          </a:solidFill>
-          <a:ln w="19050">
-            <a:solidFill>
-              <a:schemeClr val="accent5">
-                <a:lumMod val="60000"/>
-                <a:lumOff val="40000"/>
-              </a:schemeClr>
-            </a:solidFill>
-          </a:ln>
-          <a:effectLst/>
-        </p:spPr>
-        <p:style>
-          <a:lnRef idx="1">
-            <a:schemeClr val="accent2"/>
-          </a:lnRef>
-          <a:fillRef idx="2">
-            <a:schemeClr val="accent2"/>
-          </a:fillRef>
-          <a:effectRef idx="1">
-            <a:schemeClr val="accent2"/>
-          </a:effectRef>
-          <a:fontRef idx="minor">
-            <a:schemeClr val="dk1"/>
-          </a:fontRef>
-        </p:style>
-        <p:txBody>
-          <a:bodyPr rtlCol="0" anchor="ctr"/>
-          <a:lstStyle/>
-          <a:p>
-            <a:pPr algn="ctr"/>
-            <a:r>
               <a:rPr lang="en-SG" sz="1050" dirty="0" err="1">
                 <a:solidFill>
                   <a:schemeClr val="bg1"/>
@@ -4857,98 +4712,6 @@
           </a:p>
         </p:txBody>
       </p:sp>
-      <p:cxnSp>
-        <p:nvCxnSpPr>
-          <p:cNvPr id="13" name="Elbow Connector 12"/>
-          <p:cNvCxnSpPr>
-            <a:cxnSpLocks/>
-            <a:stCxn id="60" idx="1"/>
-            <a:endCxn id="58" idx="2"/>
-          </p:cNvCxnSpPr>
-          <p:nvPr/>
-        </p:nvCxnSpPr>
-        <p:spPr>
-          <a:xfrm rot="10800000">
-            <a:off x="2601618" y="2629061"/>
-            <a:ext cx="584708" cy="354574"/>
-          </a:xfrm>
-          <a:prstGeom prst="bentConnector2">
-            <a:avLst/>
-          </a:prstGeom>
-          <a:ln w="19050">
-            <a:solidFill>
-              <a:schemeClr val="accent5">
-                <a:lumMod val="60000"/>
-                <a:lumOff val="40000"/>
-              </a:schemeClr>
-            </a:solidFill>
-            <a:prstDash val="sysDot"/>
-            <a:headEnd type="none" w="med" len="med"/>
-            <a:tailEnd type="arrow" w="med" len="med"/>
-          </a:ln>
-          <a:effectLst/>
-        </p:spPr>
-        <p:style>
-          <a:lnRef idx="1">
-            <a:schemeClr val="accent2"/>
-          </a:lnRef>
-          <a:fillRef idx="2">
-            <a:schemeClr val="accent2"/>
-          </a:fillRef>
-          <a:effectRef idx="1">
-            <a:schemeClr val="accent2"/>
-          </a:effectRef>
-          <a:fontRef idx="minor">
-            <a:schemeClr val="dk1"/>
-          </a:fontRef>
-        </p:style>
-      </p:cxnSp>
-      <p:cxnSp>
-        <p:nvCxnSpPr>
-          <p:cNvPr id="50" name="Elbow Connector 49"/>
-          <p:cNvCxnSpPr>
-            <a:cxnSpLocks/>
-            <a:stCxn id="56" idx="1"/>
-            <a:endCxn id="58" idx="0"/>
-          </p:cNvCxnSpPr>
-          <p:nvPr/>
-        </p:nvCxnSpPr>
-        <p:spPr>
-          <a:xfrm rot="10800000" flipV="1">
-            <a:off x="2601618" y="2036175"/>
-            <a:ext cx="572596" cy="418306"/>
-          </a:xfrm>
-          <a:prstGeom prst="bentConnector2">
-            <a:avLst/>
-          </a:prstGeom>
-          <a:ln w="19050">
-            <a:solidFill>
-              <a:schemeClr val="accent5">
-                <a:lumMod val="60000"/>
-                <a:lumOff val="40000"/>
-              </a:schemeClr>
-            </a:solidFill>
-            <a:prstDash val="sysDot"/>
-            <a:headEnd type="none" w="med" len="med"/>
-            <a:tailEnd type="arrow" w="med" len="med"/>
-          </a:ln>
-          <a:effectLst/>
-        </p:spPr>
-        <p:style>
-          <a:lnRef idx="1">
-            <a:schemeClr val="accent2"/>
-          </a:lnRef>
-          <a:fillRef idx="2">
-            <a:schemeClr val="accent2"/>
-          </a:fillRef>
-          <a:effectRef idx="1">
-            <a:schemeClr val="accent2"/>
-          </a:effectRef>
-          <a:fontRef idx="minor">
-            <a:schemeClr val="dk1"/>
-          </a:fontRef>
-        </p:style>
-      </p:cxnSp>
       <p:grpSp>
         <p:nvGrpSpPr>
           <p:cNvPr id="68" name="Group 67"/>
@@ -5202,8 +4965,8 @@
         </p:nvSpPr>
         <p:spPr>
           <a:xfrm>
-            <a:off x="3174214" y="2370131"/>
-            <a:ext cx="750156" cy="340758"/>
+            <a:off x="2876131" y="2370131"/>
+            <a:ext cx="1048240" cy="340758"/>
           </a:xfrm>
           <a:prstGeom prst="rect">
             <a:avLst/>
@@ -5244,127 +5007,21 @@
           <a:p>
             <a:pPr algn="ctr"/>
             <a:r>
-              <a:rPr lang="en-SG" sz="1050" dirty="0">
+              <a:rPr lang="en-SG" sz="1050" dirty="0" err="1" smtClean="0">
                 <a:solidFill>
                   <a:schemeClr val="bg1"/>
                 </a:solidFill>
               </a:rPr>
-              <a:t>Argument</a:t>
-            </a:r>
-            <a:br>
-              <a:rPr lang="en-SG" sz="1050" dirty="0">
-                <a:solidFill>
-                  <a:schemeClr val="bg1"/>
-                </a:solidFill>
-              </a:rPr>
-            </a:br>
-            <a:r>
-              <a:rPr lang="en-SG" sz="1050" dirty="0">
-                <a:solidFill>
-                  <a:schemeClr val="bg1"/>
-                </a:solidFill>
-              </a:rPr>
-              <a:t>Multimap</a:t>
-            </a:r>
-          </a:p>
-        </p:txBody>
-      </p:sp>
-      <p:cxnSp>
-        <p:nvCxnSpPr>
-          <p:cNvPr id="112" name="Elbow Connector 12"/>
-          <p:cNvCxnSpPr>
-            <a:cxnSpLocks/>
-            <a:stCxn id="109" idx="1"/>
-            <a:endCxn id="58" idx="3"/>
-          </p:cNvCxnSpPr>
-          <p:nvPr/>
-        </p:nvCxnSpPr>
-        <p:spPr>
-          <a:xfrm rot="10800000" flipV="1">
-            <a:off x="2964740" y="2540509"/>
-            <a:ext cx="209475" cy="1261"/>
-          </a:xfrm>
-          <a:prstGeom prst="bentConnector3">
-            <a:avLst>
-              <a:gd name="adj1" fmla="val 50000"/>
-            </a:avLst>
-          </a:prstGeom>
-          <a:ln w="19050">
-            <a:solidFill>
-              <a:schemeClr val="accent5">
-                <a:lumMod val="60000"/>
-                <a:lumOff val="40000"/>
-              </a:schemeClr>
-            </a:solidFill>
-            <a:prstDash val="sysDot"/>
-            <a:headEnd type="none" w="med" len="med"/>
-            <a:tailEnd type="arrow" w="med" len="med"/>
-          </a:ln>
-          <a:effectLst/>
-        </p:spPr>
-        <p:style>
-          <a:lnRef idx="1">
-            <a:schemeClr val="accent2"/>
-          </a:lnRef>
-          <a:fillRef idx="2">
-            <a:schemeClr val="accent2"/>
-          </a:fillRef>
-          <a:effectRef idx="1">
-            <a:schemeClr val="accent2"/>
-          </a:effectRef>
-          <a:fontRef idx="minor">
-            <a:schemeClr val="dk1"/>
-          </a:fontRef>
-        </p:style>
-      </p:cxnSp>
-      <p:cxnSp>
-        <p:nvCxnSpPr>
-          <p:cNvPr id="118" name="Elbow Connector 49"/>
-          <p:cNvCxnSpPr>
-            <a:cxnSpLocks/>
-            <a:stCxn id="56" idx="2"/>
-            <a:endCxn id="109" idx="0"/>
-          </p:cNvCxnSpPr>
-          <p:nvPr/>
-        </p:nvCxnSpPr>
-        <p:spPr>
-          <a:xfrm rot="5400000">
-            <a:off x="3469242" y="2289605"/>
-            <a:ext cx="160576" cy="476"/>
-          </a:xfrm>
-          <a:prstGeom prst="bentConnector3">
-            <a:avLst>
-              <a:gd name="adj1" fmla="val 50000"/>
-            </a:avLst>
-          </a:prstGeom>
-          <a:ln w="19050">
-            <a:solidFill>
-              <a:schemeClr val="accent5">
-                <a:lumMod val="60000"/>
-                <a:lumOff val="40000"/>
-              </a:schemeClr>
-            </a:solidFill>
-            <a:prstDash val="sysDot"/>
-            <a:headEnd type="none" w="med" len="med"/>
-            <a:tailEnd type="arrow" w="med" len="med"/>
-          </a:ln>
-          <a:effectLst/>
-        </p:spPr>
-        <p:style>
-          <a:lnRef idx="1">
-            <a:schemeClr val="accent2"/>
-          </a:lnRef>
-          <a:fillRef idx="2">
-            <a:schemeClr val="accent2"/>
-          </a:fillRef>
-          <a:effectRef idx="1">
-            <a:schemeClr val="accent2"/>
-          </a:effectRef>
-          <a:fontRef idx="minor">
-            <a:schemeClr val="dk1"/>
-          </a:fontRef>
-        </p:style>
-      </p:cxnSp>
+              <a:t>XYZArgument</a:t>
+            </a:r>
+            <a:endParaRPr lang="en-SG" sz="1050" dirty="0">
+              <a:solidFill>
+                <a:schemeClr val="bg1"/>
+              </a:solidFill>
+            </a:endParaRPr>
+          </a:p>
+        </p:txBody>
+      </p:sp>
       <p:sp>
         <p:nvSpPr>
           <p:cNvPr id="86" name="Rectangle 62"/>
@@ -5848,7 +5505,7 @@
       </p:sp>
       <p:cxnSp>
         <p:nvCxnSpPr>
-          <p:cNvPr id="101" name="Elbow Connector 12"/>
+          <p:cNvPr id="102" name="Elbow Connector 12"/>
           <p:cNvCxnSpPr>
             <a:cxnSpLocks/>
             <a:stCxn id="42" idx="3"/>
@@ -5857,8 +5514,8 @@
         </p:nvCxnSpPr>
         <p:spPr>
           <a:xfrm rot="10800000">
-            <a:off x="3917734" y="2058661"/>
-            <a:ext cx="1156608" cy="855530"/>
+            <a:off x="3921964" y="2540511"/>
+            <a:ext cx="1152379" cy="373681"/>
           </a:xfrm>
           <a:prstGeom prst="bentConnector3">
             <a:avLst>
@@ -5895,7 +5552,7 @@
       </p:cxnSp>
       <p:cxnSp>
         <p:nvCxnSpPr>
-          <p:cNvPr id="102" name="Elbow Connector 12"/>
+          <p:cNvPr id="103" name="Elbow Connector 12"/>
           <p:cNvCxnSpPr>
             <a:cxnSpLocks/>
             <a:stCxn id="42" idx="3"/>
@@ -5903,9 +5560,9 @@
           <p:nvPr/>
         </p:nvCxnSpPr>
         <p:spPr>
-          <a:xfrm rot="10800000">
-            <a:off x="3921964" y="2540511"/>
-            <a:ext cx="1152379" cy="373681"/>
+          <a:xfrm rot="10800000" flipV="1">
+            <a:off x="3926192" y="2914191"/>
+            <a:ext cx="1148150" cy="108168"/>
           </a:xfrm>
           <a:prstGeom prst="bentConnector3">
             <a:avLst>
@@ -5942,7 +5599,7 @@
       </p:cxnSp>
       <p:cxnSp>
         <p:nvCxnSpPr>
-          <p:cNvPr id="103" name="Elbow Connector 12"/>
+          <p:cNvPr id="104" name="Elbow Connector 12"/>
           <p:cNvCxnSpPr>
             <a:cxnSpLocks/>
             <a:stCxn id="42" idx="3"/>
@@ -5951,8 +5608,8 @@
         </p:nvCxnSpPr>
         <p:spPr>
           <a:xfrm rot="10800000" flipV="1">
-            <a:off x="3926192" y="2914191"/>
-            <a:ext cx="1148150" cy="108168"/>
+            <a:off x="3930422" y="2914191"/>
+            <a:ext cx="1143921" cy="439870"/>
           </a:xfrm>
           <a:prstGeom prst="bentConnector3">
             <a:avLst>
@@ -5989,53 +5646,6 @@
       </p:cxnSp>
       <p:cxnSp>
         <p:nvCxnSpPr>
-          <p:cNvPr id="104" name="Elbow Connector 12"/>
-          <p:cNvCxnSpPr>
-            <a:cxnSpLocks/>
-            <a:stCxn id="42" idx="3"/>
-          </p:cNvCxnSpPr>
-          <p:nvPr/>
-        </p:nvCxnSpPr>
-        <p:spPr>
-          <a:xfrm rot="10800000" flipV="1">
-            <a:off x="3930422" y="2914191"/>
-            <a:ext cx="1143921" cy="439870"/>
-          </a:xfrm>
-          <a:prstGeom prst="bentConnector3">
-            <a:avLst>
-              <a:gd name="adj1" fmla="val 50000"/>
-            </a:avLst>
-          </a:prstGeom>
-          <a:ln w="19050">
-            <a:solidFill>
-              <a:schemeClr val="accent5">
-                <a:lumMod val="60000"/>
-                <a:lumOff val="40000"/>
-              </a:schemeClr>
-            </a:solidFill>
-            <a:prstDash val="sysDot"/>
-            <a:headEnd type="none" w="med" len="med"/>
-            <a:tailEnd type="arrow" w="med" len="med"/>
-          </a:ln>
-          <a:effectLst/>
-        </p:spPr>
-        <p:style>
-          <a:lnRef idx="1">
-            <a:schemeClr val="accent2"/>
-          </a:lnRef>
-          <a:fillRef idx="2">
-            <a:schemeClr val="accent2"/>
-          </a:fillRef>
-          <a:effectRef idx="1">
-            <a:schemeClr val="accent2"/>
-          </a:effectRef>
-          <a:fontRef idx="minor">
-            <a:schemeClr val="dk1"/>
-          </a:fontRef>
-        </p:style>
-      </p:cxnSp>
-      <p:cxnSp>
-        <p:nvCxnSpPr>
           <p:cNvPr id="51" name="Elbow Connector 50"/>
           <p:cNvCxnSpPr>
             <a:stCxn id="16" idx="3"/>
@@ -6126,8 +5736,8 @@
         </p:nvSpPr>
         <p:spPr>
           <a:xfrm>
-            <a:off x="6263130" y="1981200"/>
-            <a:ext cx="1276614" cy="630473"/>
+            <a:off x="6218728" y="1714852"/>
+            <a:ext cx="1629872" cy="788632"/>
           </a:xfrm>
           <a:prstGeom prst="foldedCorner">
             <a:avLst/>
@@ -6186,7 +5796,7 @@
                   <a:schemeClr val="bg1"/>
                 </a:solidFill>
               </a:rPr>
-              <a:t>AddCommand</a:t>
+              <a:t>AddModuleCommand</a:t>
             </a:r>
             <a:r>
               <a:rPr lang="en-US" sz="1050" dirty="0" smtClean="0">
@@ -6202,7 +5812,7 @@
                   <a:schemeClr val="bg1"/>
                 </a:solidFill>
               </a:rPr>
-              <a:t>FindCommand</a:t>
+              <a:t>DeleteModuleCommand</a:t>
             </a:r>
             <a:r>
               <a:rPr lang="en-US" sz="1050" dirty="0" smtClean="0">
@@ -6230,6 +5840,13 @@
   <p:clrMapOvr>
     <a:masterClrMapping/>
   </p:clrMapOvr>
+  <p:timing>
+    <p:tnLst>
+      <p:par>
+        <p:cTn id="1" dur="indefinite" restart="never" nodeType="tmRoot"/>
+      </p:par>
+    </p:tnLst>
+  </p:timing>
 </p:sld>
 </file>
 

</xml_diff>